<commit_message>
changed title in poster template
</commit_message>
<xml_diff>
--- a/templates/poster-template.pptx
+++ b/templates/poster-template.pptx
@@ -549,53 +549,7 @@
                 <a:cs typeface="+mn-cs"/>
                 <a:sym typeface="Helvetica Neue"/>
               </a:rPr>
-              <a:t> under </a:t>
-            </a:r>
-            <a:r>
-              <a:rPr kumimoji="0" lang="en-US" sz="2400" b="0" i="1" u="none" strike="noStrike" cap="none" spc="0" normalizeH="0" baseline="0" dirty="0" smtClean="0">
-                <a:ln>
-                  <a:noFill/>
-                </a:ln>
-                <a:solidFill>
-                  <a:schemeClr val="bg2">
-                    <a:lumMod val="50000"/>
-                  </a:schemeClr>
-                </a:solidFill>
-                <a:effectLst/>
-                <a:uFill>
-                  <a:solidFill>
-                    <a:srgbClr val="000000"/>
-                  </a:solidFill>
-                </a:uFill>
-                <a:latin typeface="+mn-lt"/>
-                <a:ea typeface="+mn-ea"/>
-                <a:cs typeface="+mn-cs"/>
-                <a:sym typeface="Helvetica Neue"/>
-              </a:rPr>
-              <a:t>grant agreement </a:t>
-            </a:r>
-            <a:r>
-              <a:rPr kumimoji="0" lang="en-US" sz="2400" b="0" i="1" u="none" strike="noStrike" cap="none" spc="0" normalizeH="0" baseline="0" dirty="0" smtClean="0">
-                <a:ln>
-                  <a:noFill/>
-                </a:ln>
-                <a:solidFill>
-                  <a:schemeClr val="bg2">
-                    <a:lumMod val="50000"/>
-                  </a:schemeClr>
-                </a:solidFill>
-                <a:effectLst/>
-                <a:uFill>
-                  <a:solidFill>
-                    <a:srgbClr val="000000"/>
-                  </a:solidFill>
-                </a:uFill>
-                <a:latin typeface="+mn-lt"/>
-                <a:ea typeface="+mn-ea"/>
-                <a:cs typeface="+mn-cs"/>
-                <a:sym typeface="Helvetica Neue"/>
-              </a:rPr>
-              <a:t>No</a:t>
+              <a:t> under grant agreement No</a:t>
             </a:r>
             <a:r>
               <a:rPr kumimoji="0" lang="en-US" sz="2400" b="0" i="1" u="none" strike="noStrike" cap="none" spc="0" normalizeH="0" dirty="0" smtClean="0">
@@ -684,7 +638,30 @@
                 <a:cs typeface="+mn-cs"/>
                 <a:sym typeface="Helvetica Neue"/>
               </a:rPr>
-              <a:t>The </a:t>
+              <a:t>The opinions expressed and arguments employed reflect only the authors' </a:t>
+            </a:r>
+            <a:r>
+              <a:rPr kumimoji="0" lang="en-US" sz="2400" b="0" i="1" u="none" strike="noStrike" cap="none" spc="0" normalizeH="0" dirty="0" smtClean="0">
+                <a:ln>
+                  <a:noFill/>
+                </a:ln>
+                <a:solidFill>
+                  <a:schemeClr val="bg2">
+                    <a:lumMod val="50000"/>
+                  </a:schemeClr>
+                </a:solidFill>
+                <a:effectLst/>
+                <a:uFill>
+                  <a:solidFill>
+                    <a:srgbClr val="000000"/>
+                  </a:solidFill>
+                </a:uFill>
+                <a:latin typeface="+mn-lt"/>
+                <a:ea typeface="+mn-ea"/>
+                <a:cs typeface="+mn-cs"/>
+                <a:sym typeface="Helvetica Neue"/>
+              </a:rPr>
+              <a:t> </a:t>
             </a:r>
             <a:r>
               <a:rPr kumimoji="0" lang="en-US" sz="2400" b="0" i="1" u="none" strike="noStrike" cap="none" spc="0" normalizeH="0" baseline="0" dirty="0" smtClean="0">
@@ -707,76 +684,7 @@
                 <a:cs typeface="+mn-cs"/>
                 <a:sym typeface="Helvetica Neue"/>
               </a:rPr>
-              <a:t>opinions expressed and arguments employed reflect only the authors' </a:t>
-            </a:r>
-            <a:r>
-              <a:rPr kumimoji="0" lang="en-US" sz="2400" b="0" i="1" u="none" strike="noStrike" cap="none" spc="0" normalizeH="0" dirty="0" smtClean="0">
-                <a:ln>
-                  <a:noFill/>
-                </a:ln>
-                <a:solidFill>
-                  <a:schemeClr val="bg2">
-                    <a:lumMod val="50000"/>
-                  </a:schemeClr>
-                </a:solidFill>
-                <a:effectLst/>
-                <a:uFill>
-                  <a:solidFill>
-                    <a:srgbClr val="000000"/>
-                  </a:solidFill>
-                </a:uFill>
-                <a:latin typeface="+mn-lt"/>
-                <a:ea typeface="+mn-ea"/>
-                <a:cs typeface="+mn-cs"/>
-                <a:sym typeface="Helvetica Neue"/>
-              </a:rPr>
-              <a:t> </a:t>
-            </a:r>
-            <a:r>
-              <a:rPr kumimoji="0" lang="en-US" sz="2400" b="0" i="1" u="none" strike="noStrike" cap="none" spc="0" normalizeH="0" baseline="0" dirty="0" smtClean="0">
-                <a:ln>
-                  <a:noFill/>
-                </a:ln>
-                <a:solidFill>
-                  <a:schemeClr val="bg2">
-                    <a:lumMod val="50000"/>
-                  </a:schemeClr>
-                </a:solidFill>
-                <a:effectLst/>
-                <a:uFill>
-                  <a:solidFill>
-                    <a:srgbClr val="000000"/>
-                  </a:solidFill>
-                </a:uFill>
-                <a:latin typeface="+mn-lt"/>
-                <a:ea typeface="+mn-ea"/>
-                <a:cs typeface="+mn-cs"/>
-                <a:sym typeface="Helvetica Neue"/>
-              </a:rPr>
-              <a:t>view</a:t>
-            </a:r>
-            <a:r>
-              <a:rPr kumimoji="0" lang="en-US" sz="2400" b="0" i="1" u="none" strike="noStrike" cap="none" spc="0" normalizeH="0" baseline="0" dirty="0" smtClean="0">
-                <a:ln>
-                  <a:noFill/>
-                </a:ln>
-                <a:solidFill>
-                  <a:schemeClr val="bg2">
-                    <a:lumMod val="50000"/>
-                  </a:schemeClr>
-                </a:solidFill>
-                <a:effectLst/>
-                <a:uFill>
-                  <a:solidFill>
-                    <a:srgbClr val="000000"/>
-                  </a:solidFill>
-                </a:uFill>
-                <a:latin typeface="+mn-lt"/>
-                <a:ea typeface="+mn-ea"/>
-                <a:cs typeface="+mn-cs"/>
-                <a:sym typeface="Helvetica Neue"/>
-              </a:rPr>
-              <a:t>. The European Commission is not responsible for any use that may be made of that information.</a:t>
+              <a:t>view. The European Commission is not responsible for any use that may be made of that information.</a:t>
             </a:r>
             <a:endParaRPr kumimoji="0" lang="en-US" sz="2400" b="0" i="1" u="none" strike="noStrike" cap="none" spc="0" normalizeH="0" baseline="0" dirty="0">
               <a:ln>
@@ -863,26 +771,6 @@
               </a:rPr>
               <a:t>Supported by the Swiss State Secretariat for Education, Research and Innovation under contract number 15.0268. </a:t>
             </a:r>
-            <a:endParaRPr kumimoji="0" lang="en-US" sz="2400" b="0" i="1" u="none" strike="noStrike" cap="none" spc="0" normalizeH="0" baseline="0" dirty="0" smtClean="0">
-              <a:ln>
-                <a:noFill/>
-              </a:ln>
-              <a:solidFill>
-                <a:schemeClr val="bg2">
-                  <a:lumMod val="50000"/>
-                </a:schemeClr>
-              </a:solidFill>
-              <a:effectLst/>
-              <a:uFill>
-                <a:solidFill>
-                  <a:srgbClr val="000000"/>
-                </a:solidFill>
-              </a:uFill>
-              <a:latin typeface="+mn-lt"/>
-              <a:ea typeface="+mn-ea"/>
-              <a:cs typeface="+mn-cs"/>
-              <a:sym typeface="Helvetica Neue"/>
-            </a:endParaRPr>
           </a:p>
           <a:p>
             <a:pPr marL="0" marR="0" indent="0" algn="ctr" defTabSz="1295400" rtl="0" fontAlgn="auto" latinLnBrk="1" hangingPunct="0">
@@ -1144,77 +1032,6 @@
               <a:latin typeface="Arial" panose="020B0604020202020204" pitchFamily="34" charset="0"/>
               <a:cs typeface="Arial" panose="020B0604020202020204" pitchFamily="34" charset="0"/>
             </a:endParaRPr>
-          </a:p>
-        </p:txBody>
-      </p:sp>
-      <p:sp>
-        <p:nvSpPr>
-          <p:cNvPr id="21" name="Titel 1"/>
-          <p:cNvSpPr txBox="1">
-            <a:spLocks/>
-          </p:cNvSpPr>
-          <p:nvPr userDrawn="1"/>
-        </p:nvSpPr>
-        <p:spPr>
-          <a:xfrm>
-            <a:off x="666000" y="4140000"/>
-            <a:ext cx="28878903" cy="1433640"/>
-          </a:xfrm>
-          <a:prstGeom prst="rect">
-            <a:avLst/>
-          </a:prstGeom>
-        </p:spPr>
-        <p:txBody>
-          <a:bodyPr anchor="t"/>
-          <a:lstStyle>
-            <a:lvl1pPr algn="ctr" defTabSz="3027487" rtl="0" eaLnBrk="1" latinLnBrk="0" hangingPunct="1">
-              <a:lnSpc>
-                <a:spcPct val="90000"/>
-              </a:lnSpc>
-              <a:spcBef>
-                <a:spcPct val="0"/>
-              </a:spcBef>
-              <a:buNone/>
-              <a:defRPr sz="6000" kern="1200">
-                <a:solidFill>
-                  <a:schemeClr val="tx1"/>
-                </a:solidFill>
-                <a:latin typeface="+mj-lt"/>
-                <a:ea typeface="+mj-ea"/>
-                <a:cs typeface="+mj-cs"/>
-              </a:defRPr>
-            </a:lvl1pPr>
-          </a:lstStyle>
-          <a:p>
-            <a:r>
-              <a:rPr lang="en-US" sz="9600" b="1" dirty="0" err="1" smtClean="0"/>
-              <a:t>Titelmasterformat</a:t>
-            </a:r>
-            <a:r>
-              <a:rPr lang="en-US" sz="9600" b="1" dirty="0" smtClean="0"/>
-              <a:t> </a:t>
-            </a:r>
-            <a:r>
-              <a:rPr lang="en-US" sz="9600" b="1" dirty="0" err="1" smtClean="0"/>
-              <a:t>durch</a:t>
-            </a:r>
-            <a:r>
-              <a:rPr lang="en-US" sz="9600" b="1" dirty="0" smtClean="0"/>
-              <a:t> </a:t>
-            </a:r>
-            <a:r>
-              <a:rPr lang="en-US" sz="9600" b="1" dirty="0" err="1" smtClean="0"/>
-              <a:t>Klicken</a:t>
-            </a:r>
-            <a:r>
-              <a:rPr lang="en-US" sz="9600" b="1" dirty="0" smtClean="0"/>
-              <a:t> </a:t>
-            </a:r>
-            <a:r>
-              <a:rPr lang="en-US" sz="9600" b="1" dirty="0" err="1" smtClean="0"/>
-              <a:t>bearbeiten</a:t>
-            </a:r>
-            <a:endParaRPr lang="en-US" sz="9600" b="1" dirty="0"/>
           </a:p>
         </p:txBody>
       </p:sp>
@@ -1555,7 +1372,7 @@
           </a:ln>
           <a:extLst>
             <a:ext uri="{C572A759-6A51-4108-AA02-DFA0A04FC94B}">
-              <ma14:wrappingTextBoxFlag xmlns:ma14="http://schemas.microsoft.com/office/mac/drawingml/2011/main" xmlns="" val="1"/>
+              <ma14:wrappingTextBoxFlag xmlns="" xmlns:ma14="http://schemas.microsoft.com/office/mac/drawingml/2011/main" val="1"/>
             </a:ext>
           </a:extLst>
         </p:spPr>
@@ -1606,7 +1423,7 @@
           </a:ln>
           <a:extLst>
             <a:ext uri="{C572A759-6A51-4108-AA02-DFA0A04FC94B}">
-              <ma14:wrappingTextBoxFlag xmlns:ma14="http://schemas.microsoft.com/office/mac/drawingml/2011/main" xmlns="" val="1"/>
+              <ma14:wrappingTextBoxFlag xmlns="" xmlns:ma14="http://schemas.microsoft.com/office/mac/drawingml/2011/main" val="1"/>
             </a:ext>
           </a:extLst>
         </p:spPr>
@@ -1660,7 +1477,7 @@
           </a:ln>
           <a:extLst>
             <a:ext uri="{C572A759-6A51-4108-AA02-DFA0A04FC94B}">
-              <ma14:wrappingTextBoxFlag xmlns:ma14="http://schemas.microsoft.com/office/mac/drawingml/2011/main" xmlns="" val="1"/>
+              <ma14:wrappingTextBoxFlag xmlns="" xmlns:ma14="http://schemas.microsoft.com/office/mac/drawingml/2011/main" val="1"/>
             </a:ext>
           </a:extLst>
         </p:spPr>
@@ -1724,7 +1541,7 @@
           </a:ln>
           <a:extLst>
             <a:ext uri="{C572A759-6A51-4108-AA02-DFA0A04FC94B}">
-              <ma14:wrappingTextBoxFlag xmlns:ma14="http://schemas.microsoft.com/office/mac/drawingml/2011/main" xmlns="" val="1"/>
+              <ma14:wrappingTextBoxFlag xmlns="" xmlns:ma14="http://schemas.microsoft.com/office/mac/drawingml/2011/main" val="1"/>
             </a:ext>
           </a:extLst>
         </p:spPr>
@@ -1803,7 +1620,7 @@
           </a:ln>
           <a:extLst>
             <a:ext uri="{C572A759-6A51-4108-AA02-DFA0A04FC94B}">
-              <ma14:wrappingTextBoxFlag xmlns:ma14="http://schemas.microsoft.com/office/mac/drawingml/2011/main" xmlns="" val="1"/>
+              <ma14:wrappingTextBoxFlag xmlns="" xmlns:ma14="http://schemas.microsoft.com/office/mac/drawingml/2011/main" val="1"/>
             </a:ext>
           </a:extLst>
         </p:spPr>
@@ -1881,7 +1698,7 @@
           </a:ln>
           <a:extLst>
             <a:ext uri="{C572A759-6A51-4108-AA02-DFA0A04FC94B}">
-              <ma14:wrappingTextBoxFlag xmlns:ma14="http://schemas.microsoft.com/office/mac/drawingml/2011/main" xmlns="" val="1"/>
+              <ma14:wrappingTextBoxFlag xmlns="" xmlns:ma14="http://schemas.microsoft.com/office/mac/drawingml/2011/main" val="1"/>
             </a:ext>
           </a:extLst>
         </p:spPr>
@@ -2210,6 +2027,77 @@
           </p:spPr>
         </p:pic>
       </p:grpSp>
+      <p:sp>
+        <p:nvSpPr>
+          <p:cNvPr id="20" name="Titel 1"/>
+          <p:cNvSpPr txBox="1">
+            <a:spLocks/>
+          </p:cNvSpPr>
+          <p:nvPr/>
+        </p:nvSpPr>
+        <p:spPr>
+          <a:xfrm>
+            <a:off x="666000" y="4140000"/>
+            <a:ext cx="28878903" cy="1433640"/>
+          </a:xfrm>
+          <a:prstGeom prst="rect">
+            <a:avLst/>
+          </a:prstGeom>
+        </p:spPr>
+        <p:txBody>
+          <a:bodyPr anchor="t"/>
+          <a:lstStyle>
+            <a:lvl1pPr algn="ctr" defTabSz="3027487" rtl="0" eaLnBrk="1" latinLnBrk="0" hangingPunct="1">
+              <a:lnSpc>
+                <a:spcPct val="90000"/>
+              </a:lnSpc>
+              <a:spcBef>
+                <a:spcPct val="0"/>
+              </a:spcBef>
+              <a:buNone/>
+              <a:defRPr sz="6000" kern="1200">
+                <a:solidFill>
+                  <a:schemeClr val="tx1"/>
+                </a:solidFill>
+                <a:latin typeface="+mj-lt"/>
+                <a:ea typeface="+mj-ea"/>
+                <a:cs typeface="+mj-cs"/>
+              </a:defRPr>
+            </a:lvl1pPr>
+          </a:lstStyle>
+          <a:p>
+            <a:r>
+              <a:rPr lang="en-US" sz="9600" b="1" dirty="0" err="1" smtClean="0"/>
+              <a:t>Titelmasterformat</a:t>
+            </a:r>
+            <a:r>
+              <a:rPr lang="en-US" sz="9600" b="1" dirty="0" smtClean="0"/>
+              <a:t> </a:t>
+            </a:r>
+            <a:r>
+              <a:rPr lang="en-US" sz="9600" b="1" dirty="0" err="1" smtClean="0"/>
+              <a:t>durch</a:t>
+            </a:r>
+            <a:r>
+              <a:rPr lang="en-US" sz="9600" b="1" dirty="0" smtClean="0"/>
+              <a:t> </a:t>
+            </a:r>
+            <a:r>
+              <a:rPr lang="en-US" sz="9600" b="1" dirty="0" err="1" smtClean="0"/>
+              <a:t>Klicken</a:t>
+            </a:r>
+            <a:r>
+              <a:rPr lang="en-US" sz="9600" b="1" dirty="0" smtClean="0"/>
+              <a:t> </a:t>
+            </a:r>
+            <a:r>
+              <a:rPr lang="en-US" sz="9600" b="1" dirty="0" err="1" smtClean="0"/>
+              <a:t>bearbeiten</a:t>
+            </a:r>
+            <a:endParaRPr lang="en-US" sz="9600" b="1" dirty="0"/>
+          </a:p>
+        </p:txBody>
+      </p:sp>
     </p:spTree>
     <p:extLst>
       <p:ext uri="{BB962C8B-B14F-4D97-AF65-F5344CB8AC3E}">

</xml_diff>